<commit_message>
Neke izmjene u prezentaciji.
</commit_message>
<xml_diff>
--- a/prezentacija.pptx
+++ b/prezentacija.pptx
@@ -25,8 +25,9 @@
     <p:sldId id="276" r:id="rId19"/>
     <p:sldId id="277" r:id="rId20"/>
     <p:sldId id="278" r:id="rId21"/>
-    <p:sldId id="280" r:id="rId22"/>
-    <p:sldId id="279" r:id="rId23"/>
+    <p:sldId id="281" r:id="rId22"/>
+    <p:sldId id="280" r:id="rId23"/>
+    <p:sldId id="279" r:id="rId24"/>
   </p:sldIdLst>
   <p:sldSz cx="12192000" cy="6858000"/>
   <p:notesSz cx="6858000" cy="9144000"/>
@@ -6782,6 +6783,232 @@
           <a:chExt cx="0" cy="0"/>
         </a:xfrm>
       </p:grpSpPr>
+      <p:pic>
+        <p:nvPicPr>
+          <p:cNvPr id="1026" name="Picture 2" descr="https://scontent.fbeg2-1.fna.fbcdn.net/v/t34.0-12/13392969_10209632557394389_738624780_n.png?oh=43c6955b1f9cb7bd1f008cc7f3b258d8&amp;oe=575632D4"/>
+          <p:cNvPicPr>
+            <a:picLocks noChangeAspect="1" noChangeArrowheads="1"/>
+          </p:cNvPicPr>
+          <p:nvPr/>
+        </p:nvPicPr>
+        <p:blipFill>
+          <a:blip r:embed="rId2">
+            <a:extLst>
+              <a:ext uri="{28A0092B-C50C-407E-A947-70E740481C1C}">
+                <a14:useLocalDpi xmlns:a14="http://schemas.microsoft.com/office/drawing/2010/main" val="0"/>
+              </a:ext>
+            </a:extLst>
+          </a:blip>
+          <a:srcRect/>
+          <a:stretch>
+            <a:fillRect/>
+          </a:stretch>
+        </p:blipFill>
+        <p:spPr bwMode="auto">
+          <a:xfrm>
+            <a:off x="474441" y="855554"/>
+            <a:ext cx="3477170" cy="4994830"/>
+          </a:xfrm>
+          <a:prstGeom prst="rect">
+            <a:avLst/>
+          </a:prstGeom>
+          <a:noFill/>
+          <a:extLst>
+            <a:ext uri="{909E8E84-426E-40DD-AFC4-6F175D3DCCD1}">
+              <a14:hiddenFill xmlns:a14="http://schemas.microsoft.com/office/drawing/2010/main">
+                <a:solidFill>
+                  <a:srgbClr val="FFFFFF"/>
+                </a:solidFill>
+              </a14:hiddenFill>
+            </a:ext>
+          </a:extLst>
+        </p:spPr>
+      </p:pic>
+      <p:pic>
+        <p:nvPicPr>
+          <p:cNvPr id="2" name="Picture 1"/>
+          <p:cNvPicPr>
+            <a:picLocks noChangeAspect="1"/>
+          </p:cNvPicPr>
+          <p:nvPr/>
+        </p:nvPicPr>
+        <p:blipFill>
+          <a:blip r:embed="rId3"/>
+          <a:stretch>
+            <a:fillRect/>
+          </a:stretch>
+        </p:blipFill>
+        <p:spPr>
+          <a:xfrm>
+            <a:off x="4490670" y="855554"/>
+            <a:ext cx="3410456" cy="5053059"/>
+          </a:xfrm>
+          <a:prstGeom prst="rect">
+            <a:avLst/>
+          </a:prstGeom>
+        </p:spPr>
+      </p:pic>
+      <p:pic>
+        <p:nvPicPr>
+          <p:cNvPr id="1030" name="Picture 6" descr="https://scontent.fbeg2-1.fna.fbcdn.net/v/t34.0-12/13391057_10209632557434390_561285539_n.png?oh=2f8dcff287c97751dc506256ba287b04&amp;oe=5757143F"/>
+          <p:cNvPicPr>
+            <a:picLocks noChangeAspect="1" noChangeArrowheads="1"/>
+          </p:cNvPicPr>
+          <p:nvPr/>
+        </p:nvPicPr>
+        <p:blipFill>
+          <a:blip r:embed="rId4">
+            <a:extLst>
+              <a:ext uri="{28A0092B-C50C-407E-A947-70E740481C1C}">
+                <a14:useLocalDpi xmlns:a14="http://schemas.microsoft.com/office/drawing/2010/main" val="0"/>
+              </a:ext>
+            </a:extLst>
+          </a:blip>
+          <a:srcRect/>
+          <a:stretch>
+            <a:fillRect/>
+          </a:stretch>
+        </p:blipFill>
+        <p:spPr bwMode="auto">
+          <a:xfrm>
+            <a:off x="8238373" y="855554"/>
+            <a:ext cx="3648671" cy="5053059"/>
+          </a:xfrm>
+          <a:prstGeom prst="rect">
+            <a:avLst/>
+          </a:prstGeom>
+          <a:noFill/>
+          <a:extLst>
+            <a:ext uri="{909E8E84-426E-40DD-AFC4-6F175D3DCCD1}">
+              <a14:hiddenFill xmlns:a14="http://schemas.microsoft.com/office/drawing/2010/main">
+                <a:solidFill>
+                  <a:srgbClr val="FFFFFF"/>
+                </a:solidFill>
+              </a14:hiddenFill>
+            </a:ext>
+          </a:extLst>
+        </p:spPr>
+      </p:pic>
+      <p:sp>
+        <p:nvSpPr>
+          <p:cNvPr id="3" name="TextBox 2"/>
+          <p:cNvSpPr txBox="1"/>
+          <p:nvPr/>
+        </p:nvSpPr>
+        <p:spPr>
+          <a:xfrm>
+            <a:off x="1207363" y="6027940"/>
+            <a:ext cx="2371386" cy="369332"/>
+          </a:xfrm>
+          <a:prstGeom prst="rect">
+            <a:avLst/>
+          </a:prstGeom>
+          <a:noFill/>
+        </p:spPr>
+        <p:txBody>
+          <a:bodyPr wrap="square" rtlCol="0">
+            <a:spAutoFit/>
+          </a:bodyPr>
+          <a:lstStyle/>
+          <a:p>
+            <a:r>
+              <a:rPr lang="sr-Latn-BA" dirty="0" smtClean="0"/>
+              <a:t>Početna stranica</a:t>
+            </a:r>
+            <a:endParaRPr lang="en-US" dirty="0"/>
+          </a:p>
+        </p:txBody>
+      </p:sp>
+      <p:sp>
+        <p:nvSpPr>
+          <p:cNvPr id="6" name="TextBox 5"/>
+          <p:cNvSpPr txBox="1"/>
+          <p:nvPr/>
+        </p:nvSpPr>
+        <p:spPr>
+          <a:xfrm>
+            <a:off x="5374198" y="6027940"/>
+            <a:ext cx="1643399" cy="369332"/>
+          </a:xfrm>
+          <a:prstGeom prst="rect">
+            <a:avLst/>
+          </a:prstGeom>
+          <a:noFill/>
+        </p:spPr>
+        <p:txBody>
+          <a:bodyPr wrap="none" rtlCol="0">
+            <a:spAutoFit/>
+          </a:bodyPr>
+          <a:lstStyle/>
+          <a:p>
+            <a:r>
+              <a:rPr lang="sr-Latn-BA" dirty="0" smtClean="0"/>
+              <a:t>administrator</a:t>
+            </a:r>
+            <a:endParaRPr lang="en-US" dirty="0"/>
+          </a:p>
+        </p:txBody>
+      </p:sp>
+      <p:sp>
+        <p:nvSpPr>
+          <p:cNvPr id="7" name="TextBox 6"/>
+          <p:cNvSpPr txBox="1"/>
+          <p:nvPr/>
+        </p:nvSpPr>
+        <p:spPr>
+          <a:xfrm>
+            <a:off x="9451002" y="6027940"/>
+            <a:ext cx="1223412" cy="369332"/>
+          </a:xfrm>
+          <a:prstGeom prst="rect">
+            <a:avLst/>
+          </a:prstGeom>
+          <a:noFill/>
+        </p:spPr>
+        <p:txBody>
+          <a:bodyPr wrap="none" rtlCol="0">
+            <a:spAutoFit/>
+          </a:bodyPr>
+          <a:lstStyle/>
+          <a:p>
+            <a:r>
+              <a:rPr lang="sr-Latn-BA" dirty="0" smtClean="0"/>
+              <a:t>uposlenik</a:t>
+            </a:r>
+            <a:endParaRPr lang="en-US" dirty="0"/>
+          </a:p>
+        </p:txBody>
+      </p:sp>
+    </p:spTree>
+    <p:extLst>
+      <p:ext uri="{BB962C8B-B14F-4D97-AF65-F5344CB8AC3E}">
+        <p14:creationId xmlns:p14="http://schemas.microsoft.com/office/powerpoint/2010/main" val="935228844"/>
+      </p:ext>
+    </p:extLst>
+  </p:cSld>
+  <p:clrMapOvr>
+    <a:masterClrMapping/>
+  </p:clrMapOvr>
+</p:sld>
+</file>
+
+<file path=ppt/slides/slide22.xml><?xml version="1.0" encoding="utf-8"?>
+<p:sld xmlns:a="http://schemas.openxmlformats.org/drawingml/2006/main" xmlns:r="http://schemas.openxmlformats.org/officeDocument/2006/relationships" xmlns:p="http://schemas.openxmlformats.org/presentationml/2006/main">
+  <p:cSld>
+    <p:spTree>
+      <p:nvGrpSpPr>
+        <p:cNvPr id="1" name=""/>
+        <p:cNvGrpSpPr/>
+        <p:nvPr/>
+      </p:nvGrpSpPr>
+      <p:grpSpPr>
+        <a:xfrm>
+          <a:off x="0" y="0"/>
+          <a:ext cx="0" cy="0"/>
+          <a:chOff x="0" y="0"/>
+          <a:chExt cx="0" cy="0"/>
+        </a:xfrm>
+      </p:grpSpPr>
       <p:sp>
         <p:nvSpPr>
           <p:cNvPr id="2" name="Title 1"/>
@@ -6826,7 +7053,7 @@
           <a:bodyPr/>
           <a:lstStyle/>
           <a:p>
-            <a:endParaRPr lang="en-US"/>
+            <a:endParaRPr lang="en-US" dirty="0"/>
           </a:p>
         </p:txBody>
       </p:sp>
@@ -6843,7 +7070,7 @@
 </p:sld>
 </file>
 
-<file path=ppt/slides/slide22.xml><?xml version="1.0" encoding="utf-8"?>
+<file path=ppt/slides/slide23.xml><?xml version="1.0" encoding="utf-8"?>
 <p:sld xmlns:a="http://schemas.openxmlformats.org/drawingml/2006/main" xmlns:r="http://schemas.openxmlformats.org/officeDocument/2006/relationships" xmlns:p="http://schemas.openxmlformats.org/presentationml/2006/main">
   <p:cSld>
     <p:spTree>

</xml_diff>